<commit_message>
New Order after Humanis Training
</commit_message>
<xml_diff>
--- a/exo-sysAdmin/990-Chat-Server-XSys.pptx
+++ b/exo-sysAdmin/990-Chat-Server-XSys.pptx
@@ -20245,7 +20245,11 @@
             </a:pPr>
             <a:r>
               <a:rPr lang="fr-FR" dirty="0" err="1" smtClean="0"/>
-              <a:t>Exercises</a:t>
+              <a:t>Exercise</a:t>
+            </a:r>
+            <a:r>
+              <a:rPr lang="fr-FR" dirty="0" smtClean="0"/>
+              <a:t> 1a</a:t>
             </a:r>
             <a:endParaRPr lang="fr-FR" dirty="0"/>
           </a:p>
@@ -21188,154 +21192,13 @@
             </a:endParaRPr>
           </a:p>
           <a:p>
-            <a:pPr marL="265113" lvl="1" indent="-265113">
+            <a:pPr marL="0" lvl="1" indent="0">
               <a:lnSpc>
                 <a:spcPct val="100000"/>
               </a:lnSpc>
-            </a:pPr>
-            <a:r>
-              <a:rPr lang="fr-FR" i="0" dirty="0" err="1">
-                <a:solidFill>
-                  <a:schemeClr val="tx1">
-                    <a:lumMod val="75000"/>
-                    <a:lumOff val="25000"/>
-                  </a:schemeClr>
-                </a:solidFill>
-              </a:rPr>
-              <a:t>Run</a:t>
-            </a:r>
-            <a:r>
-              <a:rPr lang="fr-FR" i="0" dirty="0">
-                <a:solidFill>
-                  <a:schemeClr val="tx1">
-                    <a:lumMod val="75000"/>
-                    <a:lumOff val="25000"/>
-                  </a:schemeClr>
-                </a:solidFill>
-              </a:rPr>
-              <a:t> the </a:t>
-            </a:r>
-            <a:r>
-              <a:rPr lang="fr-FR" i="0" dirty="0" err="1">
-                <a:solidFill>
-                  <a:schemeClr val="tx1">
-                    <a:lumMod val="75000"/>
-                    <a:lumOff val="25000"/>
-                  </a:schemeClr>
-                </a:solidFill>
-              </a:rPr>
-              <a:t>openfire</a:t>
-            </a:r>
-            <a:r>
-              <a:rPr lang="fr-FR" i="0" dirty="0">
-                <a:solidFill>
-                  <a:schemeClr val="tx1">
-                    <a:lumMod val="75000"/>
-                    <a:lumOff val="25000"/>
-                  </a:schemeClr>
-                </a:solidFill>
-              </a:rPr>
-              <a:t> server </a:t>
-            </a:r>
-            <a:r>
-              <a:rPr lang="fr-FR" i="0" dirty="0" err="1">
-                <a:solidFill>
-                  <a:schemeClr val="tx1">
-                    <a:lumMod val="75000"/>
-                    <a:lumOff val="25000"/>
-                  </a:schemeClr>
-                </a:solidFill>
-              </a:rPr>
-              <a:t>using</a:t>
-            </a:r>
-            <a:r>
-              <a:rPr lang="fr-FR" i="0" dirty="0">
-                <a:solidFill>
-                  <a:schemeClr val="tx1">
-                    <a:lumMod val="75000"/>
-                    <a:lumOff val="25000"/>
-                  </a:schemeClr>
-                </a:solidFill>
-              </a:rPr>
-              <a:t> </a:t>
-            </a:r>
-            <a:r>
-              <a:rPr lang="fr-FR" b="0" i="0" dirty="0">
-                <a:solidFill>
-                  <a:schemeClr val="tx1">
-                    <a:lumMod val="75000"/>
-                    <a:lumOff val="25000"/>
-                  </a:schemeClr>
-                </a:solidFill>
-              </a:rPr>
-              <a:t>chat-server/bin/</a:t>
-            </a:r>
-            <a:r>
-              <a:rPr lang="fr-FR" b="0" i="0" dirty="0" err="1">
-                <a:solidFill>
-                  <a:schemeClr val="tx1">
-                    <a:lumMod val="75000"/>
-                    <a:lumOff val="25000"/>
-                  </a:schemeClr>
-                </a:solidFill>
-              </a:rPr>
-              <a:t>run.sh</a:t>
-            </a:r>
-            <a:r>
-              <a:rPr lang="fr-FR" b="0" i="0" dirty="0">
-                <a:solidFill>
-                  <a:schemeClr val="tx1">
-                    <a:lumMod val="75000"/>
-                    <a:lumOff val="25000"/>
-                  </a:schemeClr>
-                </a:solidFill>
-              </a:rPr>
-              <a:t> </a:t>
-            </a:r>
-            <a:r>
-              <a:rPr lang="fr-FR" i="0" dirty="0">
-                <a:solidFill>
-                  <a:schemeClr val="tx1">
-                    <a:lumMod val="75000"/>
-                    <a:lumOff val="25000"/>
-                  </a:schemeClr>
-                </a:solidFill>
-              </a:rPr>
-              <a:t>or </a:t>
-            </a:r>
-            <a:r>
-              <a:rPr lang="fr-FR" b="0" i="0" dirty="0" err="1">
-                <a:solidFill>
-                  <a:schemeClr val="tx1">
-                    <a:lumMod val="75000"/>
-                    <a:lumOff val="25000"/>
-                  </a:schemeClr>
-                </a:solidFill>
-              </a:rPr>
-              <a:t>run.bat</a:t>
-            </a:r>
-            <a:endParaRPr lang="fr-FR" b="0" i="0" dirty="0">
-              <a:solidFill>
-                <a:schemeClr val="tx1">
-                  <a:lumMod val="75000"/>
-                  <a:lumOff val="25000"/>
-                </a:schemeClr>
-              </a:solidFill>
-            </a:endParaRPr>
-          </a:p>
-          <a:p>
-            <a:pPr marL="265113" lvl="1" indent="-265113">
-              <a:lnSpc>
-                <a:spcPct val="100000"/>
-              </a:lnSpc>
+              <a:buNone/>
             </a:pPr>
             <a:endParaRPr lang="fr-FR" sz="2200" dirty="0" smtClean="0"/>
-          </a:p>
-          <a:p>
-            <a:pPr marL="3175" indent="0">
-              <a:buNone/>
-            </a:pPr>
-            <a:endParaRPr lang="fr-FR" sz="2200" dirty="0"/>
           </a:p>
         </p:txBody>
       </p:sp>
@@ -21404,7 +21267,11 @@
             </a:pPr>
             <a:r>
               <a:rPr lang="fr-FR" dirty="0" err="1" smtClean="0"/>
-              <a:t>Exercises</a:t>
+              <a:t>Exercise</a:t>
+            </a:r>
+            <a:r>
+              <a:rPr lang="fr-FR" dirty="0" smtClean="0"/>
+              <a:t> 1b</a:t>
             </a:r>
             <a:endParaRPr lang="fr-FR" dirty="0"/>
           </a:p>

</xml_diff>